<commit_message>
fig 9 as was, but without invalidation relationship
</commit_message>
<xml_diff>
--- a/FGCS-2019/reworked-e4-e5.pptx
+++ b/FGCS-2019/reworked-e4-e5.pptx
@@ -6378,7 +6378,7 @@
         </p:nvSpPr>
         <p:spPr>
           <a:xfrm>
-            <a:off x="7423200" y="2743200"/>
+            <a:off x="7423620" y="2706076"/>
             <a:ext cx="676800" cy="302466"/>
           </a:xfrm>
           <a:custGeom>
@@ -6427,6 +6427,7 @@
             <a:solidFill>
               <a:schemeClr val="tx1"/>
             </a:solidFill>
+            <a:tailEnd type="triangle"/>
           </a:ln>
         </p:spPr>
         <p:style>
@@ -6517,6 +6518,8 @@
             <a:solidFill>
               <a:schemeClr val="tx1"/>
             </a:solidFill>
+            <a:headEnd type="none"/>
+            <a:tailEnd type="triangle"/>
           </a:ln>
         </p:spPr>
         <p:style>
@@ -6607,6 +6610,8 @@
             <a:solidFill>
               <a:schemeClr val="tx1"/>
             </a:solidFill>
+            <a:headEnd type="none"/>
+            <a:tailEnd type="triangle"/>
           </a:ln>
         </p:spPr>
         <p:style>

</xml_diff>

<commit_message>
working on altering eabstractionEvents.tex notation
</commit_message>
<xml_diff>
--- a/FGCS-2019/reworked-e4-e5.pptx
+++ b/FGCS-2019/reworked-e4-e5.pptx
@@ -270,7 +270,7 @@
           <a:p>
             <a:fld id="{2DE544F1-4EB3-B943-BAC8-4587CDEC2BDB}" type="datetimeFigureOut">
               <a:rPr lang="en-US" smtClean="0"/>
-              <a:t>10/22/19</a:t>
+              <a:t>10/23/19</a:t>
             </a:fld>
             <a:endParaRPr lang="en-US"/>
           </a:p>
@@ -468,7 +468,7 @@
           <a:p>
             <a:fld id="{2DE544F1-4EB3-B943-BAC8-4587CDEC2BDB}" type="datetimeFigureOut">
               <a:rPr lang="en-US" smtClean="0"/>
-              <a:t>10/22/19</a:t>
+              <a:t>10/23/19</a:t>
             </a:fld>
             <a:endParaRPr lang="en-US"/>
           </a:p>
@@ -676,7 +676,7 @@
           <a:p>
             <a:fld id="{2DE544F1-4EB3-B943-BAC8-4587CDEC2BDB}" type="datetimeFigureOut">
               <a:rPr lang="en-US" smtClean="0"/>
-              <a:t>10/22/19</a:t>
+              <a:t>10/23/19</a:t>
             </a:fld>
             <a:endParaRPr lang="en-US"/>
           </a:p>
@@ -874,7 +874,7 @@
           <a:p>
             <a:fld id="{2DE544F1-4EB3-B943-BAC8-4587CDEC2BDB}" type="datetimeFigureOut">
               <a:rPr lang="en-US" smtClean="0"/>
-              <a:t>10/22/19</a:t>
+              <a:t>10/23/19</a:t>
             </a:fld>
             <a:endParaRPr lang="en-US"/>
           </a:p>
@@ -1149,7 +1149,7 @@
           <a:p>
             <a:fld id="{2DE544F1-4EB3-B943-BAC8-4587CDEC2BDB}" type="datetimeFigureOut">
               <a:rPr lang="en-US" smtClean="0"/>
-              <a:t>10/22/19</a:t>
+              <a:t>10/23/19</a:t>
             </a:fld>
             <a:endParaRPr lang="en-US"/>
           </a:p>
@@ -1414,7 +1414,7 @@
           <a:p>
             <a:fld id="{2DE544F1-4EB3-B943-BAC8-4587CDEC2BDB}" type="datetimeFigureOut">
               <a:rPr lang="en-US" smtClean="0"/>
-              <a:t>10/22/19</a:t>
+              <a:t>10/23/19</a:t>
             </a:fld>
             <a:endParaRPr lang="en-US"/>
           </a:p>
@@ -1826,7 +1826,7 @@
           <a:p>
             <a:fld id="{2DE544F1-4EB3-B943-BAC8-4587CDEC2BDB}" type="datetimeFigureOut">
               <a:rPr lang="en-US" smtClean="0"/>
-              <a:t>10/22/19</a:t>
+              <a:t>10/23/19</a:t>
             </a:fld>
             <a:endParaRPr lang="en-US"/>
           </a:p>
@@ -1967,7 +1967,7 @@
           <a:p>
             <a:fld id="{2DE544F1-4EB3-B943-BAC8-4587CDEC2BDB}" type="datetimeFigureOut">
               <a:rPr lang="en-US" smtClean="0"/>
-              <a:t>10/22/19</a:t>
+              <a:t>10/23/19</a:t>
             </a:fld>
             <a:endParaRPr lang="en-US"/>
           </a:p>
@@ -2080,7 +2080,7 @@
           <a:p>
             <a:fld id="{2DE544F1-4EB3-B943-BAC8-4587CDEC2BDB}" type="datetimeFigureOut">
               <a:rPr lang="en-US" smtClean="0"/>
-              <a:t>10/22/19</a:t>
+              <a:t>10/23/19</a:t>
             </a:fld>
             <a:endParaRPr lang="en-US"/>
           </a:p>
@@ -2391,7 +2391,7 @@
           <a:p>
             <a:fld id="{2DE544F1-4EB3-B943-BAC8-4587CDEC2BDB}" type="datetimeFigureOut">
               <a:rPr lang="en-US" smtClean="0"/>
-              <a:t>10/22/19</a:t>
+              <a:t>10/23/19</a:t>
             </a:fld>
             <a:endParaRPr lang="en-US"/>
           </a:p>
@@ -2679,7 +2679,7 @@
           <a:p>
             <a:fld id="{2DE544F1-4EB3-B943-BAC8-4587CDEC2BDB}" type="datetimeFigureOut">
               <a:rPr lang="en-US" smtClean="0"/>
-              <a:t>10/22/19</a:t>
+              <a:t>10/23/19</a:t>
             </a:fld>
             <a:endParaRPr lang="en-US"/>
           </a:p>
@@ -2920,7 +2920,7 @@
           <a:p>
             <a:fld id="{2DE544F1-4EB3-B943-BAC8-4587CDEC2BDB}" type="datetimeFigureOut">
               <a:rPr lang="en-US" smtClean="0"/>
-              <a:t>10/22/19</a:t>
+              <a:t>10/23/19</a:t>
             </a:fld>
             <a:endParaRPr lang="en-US"/>
           </a:p>
@@ -6639,6 +6639,112 @@
           </a:p>
         </p:txBody>
       </p:sp>
+      <p:sp>
+        <p:nvSpPr>
+          <p:cNvPr id="2" name="TextBox 1">
+            <a:extLst>
+              <a:ext uri="{FF2B5EF4-FFF2-40B4-BE49-F238E27FC236}">
+                <a16:creationId xmlns:a16="http://schemas.microsoft.com/office/drawing/2014/main" id="{9583FEE8-1B93-E44B-9463-4CF7BB2A6B27}"/>
+              </a:ext>
+            </a:extLst>
+          </p:cNvPr>
+          <p:cNvSpPr txBox="1"/>
+          <p:nvPr/>
+        </p:nvSpPr>
+        <p:spPr>
+          <a:xfrm>
+            <a:off x="1181999" y="3567660"/>
+            <a:ext cx="436338" cy="369332"/>
+          </a:xfrm>
+          <a:prstGeom prst="rect">
+            <a:avLst/>
+          </a:prstGeom>
+          <a:noFill/>
+        </p:spPr>
+        <p:txBody>
+          <a:bodyPr wrap="none" rtlCol="0">
+            <a:spAutoFit/>
+          </a:bodyPr>
+          <a:lstStyle/>
+          <a:p>
+            <a:r>
+              <a:rPr lang="en-US" dirty="0"/>
+              <a:t>(a)</a:t>
+            </a:r>
+          </a:p>
+        </p:txBody>
+      </p:sp>
+      <p:sp>
+        <p:nvSpPr>
+          <p:cNvPr id="76" name="TextBox 75">
+            <a:extLst>
+              <a:ext uri="{FF2B5EF4-FFF2-40B4-BE49-F238E27FC236}">
+                <a16:creationId xmlns:a16="http://schemas.microsoft.com/office/drawing/2014/main" id="{DC62E05D-2757-4B44-B812-9C572F114912}"/>
+              </a:ext>
+            </a:extLst>
+          </p:cNvPr>
+          <p:cNvSpPr txBox="1"/>
+          <p:nvPr/>
+        </p:nvSpPr>
+        <p:spPr>
+          <a:xfrm>
+            <a:off x="3984216" y="3567660"/>
+            <a:ext cx="447558" cy="369332"/>
+          </a:xfrm>
+          <a:prstGeom prst="rect">
+            <a:avLst/>
+          </a:prstGeom>
+          <a:noFill/>
+        </p:spPr>
+        <p:txBody>
+          <a:bodyPr wrap="none" rtlCol="0">
+            <a:spAutoFit/>
+          </a:bodyPr>
+          <a:lstStyle/>
+          <a:p>
+            <a:r>
+              <a:rPr lang="en-US" dirty="0"/>
+              <a:t>(b)</a:t>
+            </a:r>
+          </a:p>
+        </p:txBody>
+      </p:sp>
+      <p:sp>
+        <p:nvSpPr>
+          <p:cNvPr id="77" name="TextBox 76">
+            <a:extLst>
+              <a:ext uri="{FF2B5EF4-FFF2-40B4-BE49-F238E27FC236}">
+                <a16:creationId xmlns:a16="http://schemas.microsoft.com/office/drawing/2014/main" id="{522D202A-6B5A-384C-A960-240A56428AC5}"/>
+              </a:ext>
+            </a:extLst>
+          </p:cNvPr>
+          <p:cNvSpPr txBox="1"/>
+          <p:nvPr/>
+        </p:nvSpPr>
+        <p:spPr>
+          <a:xfrm>
+            <a:off x="7021558" y="3567660"/>
+            <a:ext cx="423514" cy="369332"/>
+          </a:xfrm>
+          <a:prstGeom prst="rect">
+            <a:avLst/>
+          </a:prstGeom>
+          <a:noFill/>
+        </p:spPr>
+        <p:txBody>
+          <a:bodyPr wrap="none" rtlCol="0">
+            <a:spAutoFit/>
+          </a:bodyPr>
+          <a:lstStyle/>
+          <a:p>
+            <a:r>
+              <a:rPr lang="en-US"/>
+              <a:t>(c)</a:t>
+            </a:r>
+            <a:endParaRPr lang="en-US" dirty="0"/>
+          </a:p>
+        </p:txBody>
+      </p:sp>
     </p:spTree>
     <p:extLst>
       <p:ext uri="{BB962C8B-B14F-4D97-AF65-F5344CB8AC3E}">

</xml_diff>